<commit_message>
Diaporama définitif pour la soutenance
</commit_message>
<xml_diff>
--- a/présentation.pptx
+++ b/présentation.pptx
@@ -4,6 +4,12 @@
   <p:sldMasterIdLst>
     <p:sldMasterId id="2147483648" r:id="rId1"/>
   </p:sldMasterIdLst>
+  <p:notesMasterIdLst>
+    <p:notesMasterId r:id="rId8"/>
+  </p:notesMasterIdLst>
+  <p:handoutMasterIdLst>
+    <p:handoutMasterId r:id="rId9"/>
+  </p:handoutMasterIdLst>
   <p:sldIdLst>
     <p:sldId id="256" r:id="rId2"/>
     <p:sldId id="257" r:id="rId3"/>
@@ -117,6 +123,698 @@
 </p:presentation>
 </file>
 
+<file path=ppt/handoutMasters/handoutMaster1.xml><?xml version="1.0" encoding="utf-8"?>
+<p:handoutMaster xmlns:a="http://schemas.openxmlformats.org/drawingml/2006/main" xmlns:r="http://schemas.openxmlformats.org/officeDocument/2006/relationships" xmlns:p="http://schemas.openxmlformats.org/presentationml/2006/main">
+  <p:cSld>
+    <p:bg>
+      <p:bgRef idx="1001">
+        <a:schemeClr val="bg1"/>
+      </p:bgRef>
+    </p:bg>
+    <p:spTree>
+      <p:nvGrpSpPr>
+        <p:cNvPr id="1" name=""/>
+        <p:cNvGrpSpPr/>
+        <p:nvPr/>
+      </p:nvGrpSpPr>
+      <p:grpSpPr>
+        <a:xfrm>
+          <a:off x="0" y="0"/>
+          <a:ext cx="0" cy="0"/>
+          <a:chOff x="0" y="0"/>
+          <a:chExt cx="0" cy="0"/>
+        </a:xfrm>
+      </p:grpSpPr>
+      <p:sp>
+        <p:nvSpPr>
+          <p:cNvPr id="2" name="Espace réservé de l'en-tête 1"/>
+          <p:cNvSpPr>
+            <a:spLocks noGrp="1"/>
+          </p:cNvSpPr>
+          <p:nvPr>
+            <p:ph type="hdr" sz="quarter"/>
+          </p:nvPr>
+        </p:nvSpPr>
+        <p:spPr>
+          <a:xfrm>
+            <a:off x="0" y="0"/>
+            <a:ext cx="2971800" cy="458788"/>
+          </a:xfrm>
+          <a:prstGeom prst="rect">
+            <a:avLst/>
+          </a:prstGeom>
+        </p:spPr>
+        <p:txBody>
+          <a:bodyPr vert="horz" lIns="91440" tIns="45720" rIns="91440" bIns="45720" rtlCol="0"/>
+          <a:lstStyle>
+            <a:lvl1pPr algn="l">
+              <a:defRPr sz="1200"/>
+            </a:lvl1pPr>
+          </a:lstStyle>
+          <a:p>
+            <a:r>
+              <a:rPr lang="fr-FR"/>
+              <a:t>Elie Kevin, Schlauder Laura, Maréchal Laure-Anne</a:t>
+            </a:r>
+          </a:p>
+        </p:txBody>
+      </p:sp>
+      <p:sp>
+        <p:nvSpPr>
+          <p:cNvPr id="3" name="Espace réservé de la date 2"/>
+          <p:cNvSpPr>
+            <a:spLocks noGrp="1"/>
+          </p:cNvSpPr>
+          <p:nvPr>
+            <p:ph type="dt" sz="quarter" idx="1"/>
+          </p:nvPr>
+        </p:nvSpPr>
+        <p:spPr>
+          <a:xfrm>
+            <a:off x="3884613" y="0"/>
+            <a:ext cx="2971800" cy="458788"/>
+          </a:xfrm>
+          <a:prstGeom prst="rect">
+            <a:avLst/>
+          </a:prstGeom>
+        </p:spPr>
+        <p:txBody>
+          <a:bodyPr vert="horz" lIns="91440" tIns="45720" rIns="91440" bIns="45720" rtlCol="0"/>
+          <a:lstStyle>
+            <a:lvl1pPr algn="r">
+              <a:defRPr sz="1200"/>
+            </a:lvl1pPr>
+          </a:lstStyle>
+          <a:p>
+            <a:fld id="{34D89867-768B-4725-A0D2-AE2CBEDEC7C4}" type="datetime1">
+              <a:rPr lang="fr-FR" smtClean="0"/>
+              <a:t>16/11/2016</a:t>
+            </a:fld>
+            <a:endParaRPr lang="fr-FR"/>
+          </a:p>
+        </p:txBody>
+      </p:sp>
+      <p:sp>
+        <p:nvSpPr>
+          <p:cNvPr id="4" name="Espace réservé du pied de page 3"/>
+          <p:cNvSpPr>
+            <a:spLocks noGrp="1"/>
+          </p:cNvSpPr>
+          <p:nvPr>
+            <p:ph type="ftr" sz="quarter" idx="2"/>
+          </p:nvPr>
+        </p:nvSpPr>
+        <p:spPr>
+          <a:xfrm>
+            <a:off x="0" y="8685213"/>
+            <a:ext cx="2971800" cy="458787"/>
+          </a:xfrm>
+          <a:prstGeom prst="rect">
+            <a:avLst/>
+          </a:prstGeom>
+        </p:spPr>
+        <p:txBody>
+          <a:bodyPr vert="horz" lIns="91440" tIns="45720" rIns="91440" bIns="45720" rtlCol="0" anchor="b"/>
+          <a:lstStyle>
+            <a:lvl1pPr algn="l">
+              <a:defRPr sz="1200"/>
+            </a:lvl1pPr>
+          </a:lstStyle>
+          <a:p>
+            <a:endParaRPr lang="fr-FR"/>
+          </a:p>
+        </p:txBody>
+      </p:sp>
+      <p:sp>
+        <p:nvSpPr>
+          <p:cNvPr id="5" name="Espace réservé du numéro de diapositive 4"/>
+          <p:cNvSpPr>
+            <a:spLocks noGrp="1"/>
+          </p:cNvSpPr>
+          <p:nvPr>
+            <p:ph type="sldNum" sz="quarter" idx="3"/>
+          </p:nvPr>
+        </p:nvSpPr>
+        <p:spPr>
+          <a:xfrm>
+            <a:off x="3884613" y="8685213"/>
+            <a:ext cx="2971800" cy="458787"/>
+          </a:xfrm>
+          <a:prstGeom prst="rect">
+            <a:avLst/>
+          </a:prstGeom>
+        </p:spPr>
+        <p:txBody>
+          <a:bodyPr vert="horz" lIns="91440" tIns="45720" rIns="91440" bIns="45720" rtlCol="0" anchor="b"/>
+          <a:lstStyle>
+            <a:lvl1pPr algn="r">
+              <a:defRPr sz="1200"/>
+            </a:lvl1pPr>
+          </a:lstStyle>
+          <a:p>
+            <a:fld id="{7D8AA437-9C0D-48A0-AEFA-13F143BBB9CF}" type="slidenum">
+              <a:rPr lang="fr-FR" smtClean="0"/>
+              <a:t>‹N°›</a:t>
+            </a:fld>
+            <a:endParaRPr lang="fr-FR"/>
+          </a:p>
+        </p:txBody>
+      </p:sp>
+    </p:spTree>
+    <p:extLst>
+      <p:ext uri="{BB962C8B-B14F-4D97-AF65-F5344CB8AC3E}">
+        <p14:creationId xmlns:p14="http://schemas.microsoft.com/office/powerpoint/2010/main" val="1473019290"/>
+      </p:ext>
+    </p:extLst>
+  </p:cSld>
+  <p:clrMap bg1="lt1" tx1="dk1" bg2="lt2" tx2="dk2" accent1="accent1" accent2="accent2" accent3="accent3" accent4="accent4" accent5="accent5" accent6="accent6" hlink="hlink" folHlink="folHlink"/>
+  <p:hf sldNum="0" ftr="0" dt="0"/>
+</p:handoutMaster>
+</file>
+
+<file path=ppt/notesMasters/notesMaster1.xml><?xml version="1.0" encoding="utf-8"?>
+<p:notesMaster xmlns:a="http://schemas.openxmlformats.org/drawingml/2006/main" xmlns:r="http://schemas.openxmlformats.org/officeDocument/2006/relationships" xmlns:p="http://schemas.openxmlformats.org/presentationml/2006/main">
+  <p:cSld>
+    <p:bg>
+      <p:bgRef idx="1001">
+        <a:schemeClr val="bg1"/>
+      </p:bgRef>
+    </p:bg>
+    <p:spTree>
+      <p:nvGrpSpPr>
+        <p:cNvPr id="1" name=""/>
+        <p:cNvGrpSpPr/>
+        <p:nvPr/>
+      </p:nvGrpSpPr>
+      <p:grpSpPr>
+        <a:xfrm>
+          <a:off x="0" y="0"/>
+          <a:ext cx="0" cy="0"/>
+          <a:chOff x="0" y="0"/>
+          <a:chExt cx="0" cy="0"/>
+        </a:xfrm>
+      </p:grpSpPr>
+      <p:sp>
+        <p:nvSpPr>
+          <p:cNvPr id="2" name="Espace réservé de l'en-tête 1"/>
+          <p:cNvSpPr>
+            <a:spLocks noGrp="1"/>
+          </p:cNvSpPr>
+          <p:nvPr>
+            <p:ph type="hdr" sz="quarter"/>
+          </p:nvPr>
+        </p:nvSpPr>
+        <p:spPr>
+          <a:xfrm>
+            <a:off x="0" y="0"/>
+            <a:ext cx="2971800" cy="458788"/>
+          </a:xfrm>
+          <a:prstGeom prst="rect">
+            <a:avLst/>
+          </a:prstGeom>
+        </p:spPr>
+        <p:txBody>
+          <a:bodyPr vert="horz" lIns="91440" tIns="45720" rIns="91440" bIns="45720" rtlCol="0"/>
+          <a:lstStyle>
+            <a:lvl1pPr algn="l">
+              <a:defRPr sz="1200"/>
+            </a:lvl1pPr>
+          </a:lstStyle>
+          <a:p>
+            <a:r>
+              <a:rPr lang="fr-FR"/>
+              <a:t>Elie Kevin, Schlauder Laura, Maréchal Laure-Anne</a:t>
+            </a:r>
+          </a:p>
+        </p:txBody>
+      </p:sp>
+      <p:sp>
+        <p:nvSpPr>
+          <p:cNvPr id="3" name="Espace réservé de la date 2"/>
+          <p:cNvSpPr>
+            <a:spLocks noGrp="1"/>
+          </p:cNvSpPr>
+          <p:nvPr>
+            <p:ph type="dt" idx="1"/>
+          </p:nvPr>
+        </p:nvSpPr>
+        <p:spPr>
+          <a:xfrm>
+            <a:off x="3884613" y="0"/>
+            <a:ext cx="2971800" cy="458788"/>
+          </a:xfrm>
+          <a:prstGeom prst="rect">
+            <a:avLst/>
+          </a:prstGeom>
+        </p:spPr>
+        <p:txBody>
+          <a:bodyPr vert="horz" lIns="91440" tIns="45720" rIns="91440" bIns="45720" rtlCol="0"/>
+          <a:lstStyle>
+            <a:lvl1pPr algn="r">
+              <a:defRPr sz="1200"/>
+            </a:lvl1pPr>
+          </a:lstStyle>
+          <a:p>
+            <a:fld id="{89EC39A0-02A8-47AB-9CDC-4CC517C5CAD3}" type="datetime1">
+              <a:rPr lang="fr-FR" smtClean="0"/>
+              <a:t>16/11/2016</a:t>
+            </a:fld>
+            <a:endParaRPr lang="fr-FR"/>
+          </a:p>
+        </p:txBody>
+      </p:sp>
+      <p:sp>
+        <p:nvSpPr>
+          <p:cNvPr id="4" name="Espace réservé de l'image des diapositives 3"/>
+          <p:cNvSpPr>
+            <a:spLocks noGrp="1" noRot="1" noChangeAspect="1"/>
+          </p:cNvSpPr>
+          <p:nvPr>
+            <p:ph type="sldImg" idx="2"/>
+          </p:nvPr>
+        </p:nvSpPr>
+        <p:spPr>
+          <a:xfrm>
+            <a:off x="685800" y="1143000"/>
+            <a:ext cx="5486400" cy="3086100"/>
+          </a:xfrm>
+          <a:prstGeom prst="rect">
+            <a:avLst/>
+          </a:prstGeom>
+          <a:noFill/>
+          <a:ln w="12700">
+            <a:solidFill>
+              <a:prstClr val="black"/>
+            </a:solidFill>
+          </a:ln>
+        </p:spPr>
+        <p:txBody>
+          <a:bodyPr vert="horz" lIns="91440" tIns="45720" rIns="91440" bIns="45720" rtlCol="0" anchor="ctr"/>
+          <a:lstStyle/>
+          <a:p>
+            <a:endParaRPr lang="fr-FR"/>
+          </a:p>
+        </p:txBody>
+      </p:sp>
+      <p:sp>
+        <p:nvSpPr>
+          <p:cNvPr id="5" name="Espace réservé des notes 4"/>
+          <p:cNvSpPr>
+            <a:spLocks noGrp="1"/>
+          </p:cNvSpPr>
+          <p:nvPr>
+            <p:ph type="body" sz="quarter" idx="3"/>
+          </p:nvPr>
+        </p:nvSpPr>
+        <p:spPr>
+          <a:xfrm>
+            <a:off x="685800" y="4400550"/>
+            <a:ext cx="5486400" cy="3600450"/>
+          </a:xfrm>
+          <a:prstGeom prst="rect">
+            <a:avLst/>
+          </a:prstGeom>
+        </p:spPr>
+        <p:txBody>
+          <a:bodyPr vert="horz" lIns="91440" tIns="45720" rIns="91440" bIns="45720" rtlCol="0"/>
+          <a:lstStyle/>
+          <a:p>
+            <a:pPr lvl="0"/>
+            <a:r>
+              <a:rPr lang="fr-FR"/>
+              <a:t>Modifier les styles du texte du masque</a:t>
+            </a:r>
+          </a:p>
+          <a:p>
+            <a:pPr lvl="1"/>
+            <a:r>
+              <a:rPr lang="fr-FR"/>
+              <a:t>Deuxième niveau</a:t>
+            </a:r>
+          </a:p>
+          <a:p>
+            <a:pPr lvl="2"/>
+            <a:r>
+              <a:rPr lang="fr-FR"/>
+              <a:t>Troisième niveau</a:t>
+            </a:r>
+          </a:p>
+          <a:p>
+            <a:pPr lvl="3"/>
+            <a:r>
+              <a:rPr lang="fr-FR"/>
+              <a:t>Quatrième niveau</a:t>
+            </a:r>
+          </a:p>
+          <a:p>
+            <a:pPr lvl="4"/>
+            <a:r>
+              <a:rPr lang="fr-FR"/>
+              <a:t>Cinquième niveau</a:t>
+            </a:r>
+          </a:p>
+        </p:txBody>
+      </p:sp>
+      <p:sp>
+        <p:nvSpPr>
+          <p:cNvPr id="6" name="Espace réservé du pied de page 5"/>
+          <p:cNvSpPr>
+            <a:spLocks noGrp="1"/>
+          </p:cNvSpPr>
+          <p:nvPr>
+            <p:ph type="ftr" sz="quarter" idx="4"/>
+          </p:nvPr>
+        </p:nvSpPr>
+        <p:spPr>
+          <a:xfrm>
+            <a:off x="0" y="8685213"/>
+            <a:ext cx="2971800" cy="458787"/>
+          </a:xfrm>
+          <a:prstGeom prst="rect">
+            <a:avLst/>
+          </a:prstGeom>
+        </p:spPr>
+        <p:txBody>
+          <a:bodyPr vert="horz" lIns="91440" tIns="45720" rIns="91440" bIns="45720" rtlCol="0" anchor="b"/>
+          <a:lstStyle>
+            <a:lvl1pPr algn="l">
+              <a:defRPr sz="1200"/>
+            </a:lvl1pPr>
+          </a:lstStyle>
+          <a:p>
+            <a:endParaRPr lang="fr-FR"/>
+          </a:p>
+        </p:txBody>
+      </p:sp>
+      <p:sp>
+        <p:nvSpPr>
+          <p:cNvPr id="7" name="Espace réservé du numéro de diapositive 6"/>
+          <p:cNvSpPr>
+            <a:spLocks noGrp="1"/>
+          </p:cNvSpPr>
+          <p:nvPr>
+            <p:ph type="sldNum" sz="quarter" idx="5"/>
+          </p:nvPr>
+        </p:nvSpPr>
+        <p:spPr>
+          <a:xfrm>
+            <a:off x="3884613" y="8685213"/>
+            <a:ext cx="2971800" cy="458787"/>
+          </a:xfrm>
+          <a:prstGeom prst="rect">
+            <a:avLst/>
+          </a:prstGeom>
+        </p:spPr>
+        <p:txBody>
+          <a:bodyPr vert="horz" lIns="91440" tIns="45720" rIns="91440" bIns="45720" rtlCol="0" anchor="b"/>
+          <a:lstStyle>
+            <a:lvl1pPr algn="r">
+              <a:defRPr sz="1200"/>
+            </a:lvl1pPr>
+          </a:lstStyle>
+          <a:p>
+            <a:fld id="{4CC41C90-4B73-45C9-BAA4-B884570922A4}" type="slidenum">
+              <a:rPr lang="fr-FR" smtClean="0"/>
+              <a:t>‹N°›</a:t>
+            </a:fld>
+            <a:endParaRPr lang="fr-FR"/>
+          </a:p>
+        </p:txBody>
+      </p:sp>
+    </p:spTree>
+    <p:extLst>
+      <p:ext uri="{BB962C8B-B14F-4D97-AF65-F5344CB8AC3E}">
+        <p14:creationId xmlns:p14="http://schemas.microsoft.com/office/powerpoint/2010/main" val="4293197634"/>
+      </p:ext>
+    </p:extLst>
+  </p:cSld>
+  <p:clrMap bg1="lt1" tx1="dk1" bg2="lt2" tx2="dk2" accent1="accent1" accent2="accent2" accent3="accent3" accent4="accent4" accent5="accent5" accent6="accent6" hlink="hlink" folHlink="folHlink"/>
+  <p:hf sldNum="0" ftr="0" dt="0"/>
+  <p:notesStyle>
+    <a:lvl1pPr marL="0" algn="l" defTabSz="914400" rtl="0" eaLnBrk="1" latinLnBrk="0" hangingPunct="1">
+      <a:defRPr sz="1200" kern="1200">
+        <a:solidFill>
+          <a:schemeClr val="tx1"/>
+        </a:solidFill>
+        <a:latin typeface="+mn-lt"/>
+        <a:ea typeface="+mn-ea"/>
+        <a:cs typeface="+mn-cs"/>
+      </a:defRPr>
+    </a:lvl1pPr>
+    <a:lvl2pPr marL="457200" algn="l" defTabSz="914400" rtl="0" eaLnBrk="1" latinLnBrk="0" hangingPunct="1">
+      <a:defRPr sz="1200" kern="1200">
+        <a:solidFill>
+          <a:schemeClr val="tx1"/>
+        </a:solidFill>
+        <a:latin typeface="+mn-lt"/>
+        <a:ea typeface="+mn-ea"/>
+        <a:cs typeface="+mn-cs"/>
+      </a:defRPr>
+    </a:lvl2pPr>
+    <a:lvl3pPr marL="914400" algn="l" defTabSz="914400" rtl="0" eaLnBrk="1" latinLnBrk="0" hangingPunct="1">
+      <a:defRPr sz="1200" kern="1200">
+        <a:solidFill>
+          <a:schemeClr val="tx1"/>
+        </a:solidFill>
+        <a:latin typeface="+mn-lt"/>
+        <a:ea typeface="+mn-ea"/>
+        <a:cs typeface="+mn-cs"/>
+      </a:defRPr>
+    </a:lvl3pPr>
+    <a:lvl4pPr marL="1371600" algn="l" defTabSz="914400" rtl="0" eaLnBrk="1" latinLnBrk="0" hangingPunct="1">
+      <a:defRPr sz="1200" kern="1200">
+        <a:solidFill>
+          <a:schemeClr val="tx1"/>
+        </a:solidFill>
+        <a:latin typeface="+mn-lt"/>
+        <a:ea typeface="+mn-ea"/>
+        <a:cs typeface="+mn-cs"/>
+      </a:defRPr>
+    </a:lvl4pPr>
+    <a:lvl5pPr marL="1828800" algn="l" defTabSz="914400" rtl="0" eaLnBrk="1" latinLnBrk="0" hangingPunct="1">
+      <a:defRPr sz="1200" kern="1200">
+        <a:solidFill>
+          <a:schemeClr val="tx1"/>
+        </a:solidFill>
+        <a:latin typeface="+mn-lt"/>
+        <a:ea typeface="+mn-ea"/>
+        <a:cs typeface="+mn-cs"/>
+      </a:defRPr>
+    </a:lvl5pPr>
+    <a:lvl6pPr marL="2286000" algn="l" defTabSz="914400" rtl="0" eaLnBrk="1" latinLnBrk="0" hangingPunct="1">
+      <a:defRPr sz="1200" kern="1200">
+        <a:solidFill>
+          <a:schemeClr val="tx1"/>
+        </a:solidFill>
+        <a:latin typeface="+mn-lt"/>
+        <a:ea typeface="+mn-ea"/>
+        <a:cs typeface="+mn-cs"/>
+      </a:defRPr>
+    </a:lvl6pPr>
+    <a:lvl7pPr marL="2743200" algn="l" defTabSz="914400" rtl="0" eaLnBrk="1" latinLnBrk="0" hangingPunct="1">
+      <a:defRPr sz="1200" kern="1200">
+        <a:solidFill>
+          <a:schemeClr val="tx1"/>
+        </a:solidFill>
+        <a:latin typeface="+mn-lt"/>
+        <a:ea typeface="+mn-ea"/>
+        <a:cs typeface="+mn-cs"/>
+      </a:defRPr>
+    </a:lvl7pPr>
+    <a:lvl8pPr marL="3200400" algn="l" defTabSz="914400" rtl="0" eaLnBrk="1" latinLnBrk="0" hangingPunct="1">
+      <a:defRPr sz="1200" kern="1200">
+        <a:solidFill>
+          <a:schemeClr val="tx1"/>
+        </a:solidFill>
+        <a:latin typeface="+mn-lt"/>
+        <a:ea typeface="+mn-ea"/>
+        <a:cs typeface="+mn-cs"/>
+      </a:defRPr>
+    </a:lvl8pPr>
+    <a:lvl9pPr marL="3657600" algn="l" defTabSz="914400" rtl="0" eaLnBrk="1" latinLnBrk="0" hangingPunct="1">
+      <a:defRPr sz="1200" kern="1200">
+        <a:solidFill>
+          <a:schemeClr val="tx1"/>
+        </a:solidFill>
+        <a:latin typeface="+mn-lt"/>
+        <a:ea typeface="+mn-ea"/>
+        <a:cs typeface="+mn-cs"/>
+      </a:defRPr>
+    </a:lvl9pPr>
+  </p:notesStyle>
+</p:notesMaster>
+</file>
+
+<file path=ppt/notesSlides/notesSlide1.xml><?xml version="1.0" encoding="utf-8"?>
+<p:notes xmlns:a="http://schemas.openxmlformats.org/drawingml/2006/main" xmlns:r="http://schemas.openxmlformats.org/officeDocument/2006/relationships" xmlns:p="http://schemas.openxmlformats.org/presentationml/2006/main">
+  <p:cSld>
+    <p:spTree>
+      <p:nvGrpSpPr>
+        <p:cNvPr id="1" name=""/>
+        <p:cNvGrpSpPr/>
+        <p:nvPr/>
+      </p:nvGrpSpPr>
+      <p:grpSpPr>
+        <a:xfrm>
+          <a:off x="0" y="0"/>
+          <a:ext cx="0" cy="0"/>
+          <a:chOff x="0" y="0"/>
+          <a:chExt cx="0" cy="0"/>
+        </a:xfrm>
+      </p:grpSpPr>
+      <p:sp>
+        <p:nvSpPr>
+          <p:cNvPr id="2" name="Espace réservé de l'image des diapositives 1"/>
+          <p:cNvSpPr>
+            <a:spLocks noGrp="1" noRot="1" noChangeAspect="1"/>
+          </p:cNvSpPr>
+          <p:nvPr>
+            <p:ph type="sldImg"/>
+          </p:nvPr>
+        </p:nvSpPr>
+        <p:spPr/>
+      </p:sp>
+      <p:sp>
+        <p:nvSpPr>
+          <p:cNvPr id="3" name="Espace réservé des notes 2"/>
+          <p:cNvSpPr>
+            <a:spLocks noGrp="1"/>
+          </p:cNvSpPr>
+          <p:nvPr>
+            <p:ph type="body" idx="1"/>
+          </p:nvPr>
+        </p:nvSpPr>
+        <p:spPr/>
+        <p:txBody>
+          <a:bodyPr/>
+          <a:lstStyle/>
+          <a:p>
+            <a:r>
+              <a:rPr lang="fr-FR" baseline="0" dirty="0"/>
+              <a:t> </a:t>
+            </a:r>
+            <a:endParaRPr lang="fr-FR" dirty="0"/>
+          </a:p>
+        </p:txBody>
+      </p:sp>
+      <p:sp>
+        <p:nvSpPr>
+          <p:cNvPr id="4" name="Espace réservé de l'en-tête 3"/>
+          <p:cNvSpPr>
+            <a:spLocks noGrp="1"/>
+          </p:cNvSpPr>
+          <p:nvPr>
+            <p:ph type="hdr" sz="quarter" idx="10"/>
+          </p:nvPr>
+        </p:nvSpPr>
+        <p:spPr/>
+        <p:txBody>
+          <a:bodyPr/>
+          <a:lstStyle/>
+          <a:p>
+            <a:r>
+              <a:rPr lang="fr-FR"/>
+              <a:t>Elie Kevin, Schlauder Laura, Maréchal Laure-Anne</a:t>
+            </a:r>
+          </a:p>
+        </p:txBody>
+      </p:sp>
+    </p:spTree>
+    <p:extLst>
+      <p:ext uri="{BB962C8B-B14F-4D97-AF65-F5344CB8AC3E}">
+        <p14:creationId xmlns:p14="http://schemas.microsoft.com/office/powerpoint/2010/main" val="1078803491"/>
+      </p:ext>
+    </p:extLst>
+  </p:cSld>
+  <p:clrMapOvr>
+    <a:masterClrMapping/>
+  </p:clrMapOvr>
+</p:notes>
+</file>
+
+<file path=ppt/notesSlides/notesSlide2.xml><?xml version="1.0" encoding="utf-8"?>
+<p:notes xmlns:a="http://schemas.openxmlformats.org/drawingml/2006/main" xmlns:r="http://schemas.openxmlformats.org/officeDocument/2006/relationships" xmlns:p="http://schemas.openxmlformats.org/presentationml/2006/main">
+  <p:cSld>
+    <p:spTree>
+      <p:nvGrpSpPr>
+        <p:cNvPr id="1" name=""/>
+        <p:cNvGrpSpPr/>
+        <p:nvPr/>
+      </p:nvGrpSpPr>
+      <p:grpSpPr>
+        <a:xfrm>
+          <a:off x="0" y="0"/>
+          <a:ext cx="0" cy="0"/>
+          <a:chOff x="0" y="0"/>
+          <a:chExt cx="0" cy="0"/>
+        </a:xfrm>
+      </p:grpSpPr>
+      <p:sp>
+        <p:nvSpPr>
+          <p:cNvPr id="2" name="Espace réservé de l'image des diapositives 1"/>
+          <p:cNvSpPr>
+            <a:spLocks noGrp="1" noRot="1" noChangeAspect="1"/>
+          </p:cNvSpPr>
+          <p:nvPr>
+            <p:ph type="sldImg"/>
+          </p:nvPr>
+        </p:nvSpPr>
+        <p:spPr/>
+      </p:sp>
+      <p:sp>
+        <p:nvSpPr>
+          <p:cNvPr id="3" name="Espace réservé des notes 2"/>
+          <p:cNvSpPr>
+            <a:spLocks noGrp="1"/>
+          </p:cNvSpPr>
+          <p:nvPr>
+            <p:ph type="body" idx="1"/>
+          </p:nvPr>
+        </p:nvSpPr>
+        <p:spPr/>
+        <p:txBody>
+          <a:bodyPr/>
+          <a:lstStyle/>
+          <a:p>
+            <a:endParaRPr lang="fr-FR" dirty="0"/>
+          </a:p>
+        </p:txBody>
+      </p:sp>
+      <p:sp>
+        <p:nvSpPr>
+          <p:cNvPr id="4" name="Espace réservé de l'en-tête 3"/>
+          <p:cNvSpPr>
+            <a:spLocks noGrp="1"/>
+          </p:cNvSpPr>
+          <p:nvPr>
+            <p:ph type="hdr" sz="quarter" idx="10"/>
+          </p:nvPr>
+        </p:nvSpPr>
+        <p:spPr/>
+        <p:txBody>
+          <a:bodyPr/>
+          <a:lstStyle/>
+          <a:p>
+            <a:r>
+              <a:rPr lang="fr-FR"/>
+              <a:t>Elie Kevin, Schlauder Laura, Maréchal Laure-Anne</a:t>
+            </a:r>
+          </a:p>
+        </p:txBody>
+      </p:sp>
+    </p:spTree>
+    <p:extLst>
+      <p:ext uri="{BB962C8B-B14F-4D97-AF65-F5344CB8AC3E}">
+        <p14:creationId xmlns:p14="http://schemas.microsoft.com/office/powerpoint/2010/main" val="1130827224"/>
+      </p:ext>
+    </p:extLst>
+  </p:cSld>
+  <p:clrMapOvr>
+    <a:masterClrMapping/>
+  </p:clrMapOvr>
+</p:notes>
+</file>
+
 <file path=ppt/slideLayouts/slideLayout1.xml><?xml version="1.0" encoding="utf-8"?>
 <p:sldLayout xmlns:a="http://schemas.openxmlformats.org/drawingml/2006/main" xmlns:r="http://schemas.openxmlformats.org/officeDocument/2006/relationships" xmlns:p="http://schemas.openxmlformats.org/presentationml/2006/main" type="title" preserve="1">
   <p:cSld name="Diapositive de titre">
@@ -244,7 +942,7 @@
           <a:bodyPr/>
           <a:lstStyle/>
           <a:p>
-            <a:fld id="{965CAEB7-6023-4A21-89BA-BF57DF7B05D5}" type="datetimeFigureOut">
+            <a:fld id="{C710B2E1-EBB3-47D9-B3C6-38C70517FC1A}" type="datetime1">
               <a:rPr lang="fr-FR" smtClean="0"/>
               <a:t>16/11/2016</a:t>
             </a:fld>
@@ -412,7 +1110,7 @@
           <a:bodyPr/>
           <a:lstStyle/>
           <a:p>
-            <a:fld id="{965CAEB7-6023-4A21-89BA-BF57DF7B05D5}" type="datetimeFigureOut">
+            <a:fld id="{F801C79F-AA6F-470B-BB6D-6C41830DB82C}" type="datetime1">
               <a:rPr lang="fr-FR" smtClean="0"/>
               <a:t>16/11/2016</a:t>
             </a:fld>
@@ -590,7 +1288,7 @@
           <a:bodyPr/>
           <a:lstStyle/>
           <a:p>
-            <a:fld id="{965CAEB7-6023-4A21-89BA-BF57DF7B05D5}" type="datetimeFigureOut">
+            <a:fld id="{32543B93-1B1E-4292-8A71-DBDF2AB581C5}" type="datetime1">
               <a:rPr lang="fr-FR" smtClean="0"/>
               <a:t>16/11/2016</a:t>
             </a:fld>
@@ -758,7 +1456,7 @@
           <a:bodyPr/>
           <a:lstStyle/>
           <a:p>
-            <a:fld id="{965CAEB7-6023-4A21-89BA-BF57DF7B05D5}" type="datetimeFigureOut">
+            <a:fld id="{D6BE7041-FE95-4613-975B-97955846D3E4}" type="datetime1">
               <a:rPr lang="fr-FR" smtClean="0"/>
               <a:t>16/11/2016</a:t>
             </a:fld>
@@ -1003,7 +1701,7 @@
           <a:bodyPr/>
           <a:lstStyle/>
           <a:p>
-            <a:fld id="{965CAEB7-6023-4A21-89BA-BF57DF7B05D5}" type="datetimeFigureOut">
+            <a:fld id="{2B6EC8D6-EBB3-4A4B-AAF7-DF022DEC130C}" type="datetime1">
               <a:rPr lang="fr-FR" smtClean="0"/>
               <a:t>16/11/2016</a:t>
             </a:fld>
@@ -1232,7 +1930,7 @@
           <a:bodyPr/>
           <a:lstStyle/>
           <a:p>
-            <a:fld id="{965CAEB7-6023-4A21-89BA-BF57DF7B05D5}" type="datetimeFigureOut">
+            <a:fld id="{0B793F4B-7D5A-4705-969C-6234EFC1A5C3}" type="datetime1">
               <a:rPr lang="fr-FR" smtClean="0"/>
               <a:t>16/11/2016</a:t>
             </a:fld>
@@ -1596,7 +2294,7 @@
           <a:bodyPr/>
           <a:lstStyle/>
           <a:p>
-            <a:fld id="{965CAEB7-6023-4A21-89BA-BF57DF7B05D5}" type="datetimeFigureOut">
+            <a:fld id="{F48FA211-82B5-4034-A146-D9DBFF703E9E}" type="datetime1">
               <a:rPr lang="fr-FR" smtClean="0"/>
               <a:t>16/11/2016</a:t>
             </a:fld>
@@ -1713,7 +2411,7 @@
           <a:bodyPr/>
           <a:lstStyle/>
           <a:p>
-            <a:fld id="{965CAEB7-6023-4A21-89BA-BF57DF7B05D5}" type="datetimeFigureOut">
+            <a:fld id="{4E74016B-163E-4F74-848F-76DDA33BA28C}" type="datetime1">
               <a:rPr lang="fr-FR" smtClean="0"/>
               <a:t>16/11/2016</a:t>
             </a:fld>
@@ -1808,7 +2506,7 @@
           <a:bodyPr/>
           <a:lstStyle/>
           <a:p>
-            <a:fld id="{965CAEB7-6023-4A21-89BA-BF57DF7B05D5}" type="datetimeFigureOut">
+            <a:fld id="{8AF15C8A-8427-4BF7-8F88-CFF0A62AD99C}" type="datetime1">
               <a:rPr lang="fr-FR" smtClean="0"/>
               <a:t>16/11/2016</a:t>
             </a:fld>
@@ -2083,7 +2781,7 @@
           <a:bodyPr/>
           <a:lstStyle/>
           <a:p>
-            <a:fld id="{965CAEB7-6023-4A21-89BA-BF57DF7B05D5}" type="datetimeFigureOut">
+            <a:fld id="{33801206-048C-4D58-9544-9E6CAA73EC77}" type="datetime1">
               <a:rPr lang="fr-FR" smtClean="0"/>
               <a:t>16/11/2016</a:t>
             </a:fld>
@@ -2335,7 +3033,7 @@
           <a:bodyPr/>
           <a:lstStyle/>
           <a:p>
-            <a:fld id="{965CAEB7-6023-4A21-89BA-BF57DF7B05D5}" type="datetimeFigureOut">
+            <a:fld id="{4EABD28E-DB3F-4C14-8B88-EC4A618BEB7B}" type="datetime1">
               <a:rPr lang="fr-FR" smtClean="0"/>
               <a:t>16/11/2016</a:t>
             </a:fld>
@@ -2546,7 +3244,7 @@
             </a:lvl1pPr>
           </a:lstStyle>
           <a:p>
-            <a:fld id="{965CAEB7-6023-4A21-89BA-BF57DF7B05D5}" type="datetimeFigureOut">
+            <a:fld id="{919CF633-A020-422A-8092-B6FDF1B96586}" type="datetime1">
               <a:rPr lang="fr-FR" smtClean="0"/>
               <a:t>16/11/2016</a:t>
             </a:fld>
@@ -2653,6 +3351,7 @@
     <p:sldLayoutId id="2147483658" r:id="rId10"/>
     <p:sldLayoutId id="2147483659" r:id="rId11"/>
   </p:sldLayoutIdLst>
+  <p:hf sldNum="0" hdr="0" ftr="0" dt="0"/>
   <p:txStyles>
     <p:titleStyle>
       <a:lvl1pPr algn="l" defTabSz="914400" rtl="0" eaLnBrk="1" latinLnBrk="0" hangingPunct="1">
@@ -2999,7 +3698,7 @@
         </p:nvSpPr>
         <p:spPr>
           <a:xfrm>
-            <a:off x="1484243" y="357808"/>
+            <a:off x="1417982" y="475349"/>
             <a:ext cx="9144000" cy="1522137"/>
           </a:xfrm>
           <a:noFill/>
@@ -3238,6 +3937,49 @@
           </a:p>
           <a:p>
             <a:endParaRPr lang="fr-FR" dirty="0"/>
+          </a:p>
+        </p:txBody>
+      </p:sp>
+      <p:sp>
+        <p:nvSpPr>
+          <p:cNvPr id="6" name="ZoneTexte 5"/>
+          <p:cNvSpPr txBox="1"/>
+          <p:nvPr/>
+        </p:nvSpPr>
+        <p:spPr>
+          <a:xfrm>
+            <a:off x="0" y="0"/>
+            <a:ext cx="5088835" cy="369332"/>
+          </a:xfrm>
+          <a:prstGeom prst="rect">
+            <a:avLst/>
+          </a:prstGeom>
+          <a:noFill/>
+        </p:spPr>
+        <p:txBody>
+          <a:bodyPr wrap="square" rtlCol="0">
+            <a:spAutoFit/>
+          </a:bodyPr>
+          <a:lstStyle/>
+          <a:p>
+            <a:r>
+              <a:rPr lang="fr-FR" dirty="0">
+                <a:latin typeface="Bell MT" panose="02020503060305020303" pitchFamily="18" charset="0"/>
+              </a:rPr>
+              <a:t>Elie Kevin, </a:t>
+            </a:r>
+            <a:r>
+              <a:rPr lang="fr-FR" dirty="0" err="1">
+                <a:latin typeface="Bell MT" panose="02020503060305020303" pitchFamily="18" charset="0"/>
+              </a:rPr>
+              <a:t>Schlauder</a:t>
+            </a:r>
+            <a:r>
+              <a:rPr lang="fr-FR" dirty="0">
+                <a:latin typeface="Bell MT" panose="02020503060305020303" pitchFamily="18" charset="0"/>
+              </a:rPr>
+              <a:t> Laura, Maréchal Laure-Anne</a:t>
+            </a:r>
           </a:p>
         </p:txBody>
       </p:sp>
@@ -3463,6 +4205,49 @@
           </a:p>
         </p:txBody>
       </p:sp>
+      <p:sp>
+        <p:nvSpPr>
+          <p:cNvPr id="6" name="ZoneTexte 5"/>
+          <p:cNvSpPr txBox="1"/>
+          <p:nvPr/>
+        </p:nvSpPr>
+        <p:spPr>
+          <a:xfrm>
+            <a:off x="0" y="0"/>
+            <a:ext cx="5088835" cy="369332"/>
+          </a:xfrm>
+          <a:prstGeom prst="rect">
+            <a:avLst/>
+          </a:prstGeom>
+          <a:noFill/>
+        </p:spPr>
+        <p:txBody>
+          <a:bodyPr wrap="square" rtlCol="0">
+            <a:spAutoFit/>
+          </a:bodyPr>
+          <a:lstStyle/>
+          <a:p>
+            <a:r>
+              <a:rPr lang="fr-FR" dirty="0">
+                <a:latin typeface="Bell MT" panose="02020503060305020303" pitchFamily="18" charset="0"/>
+              </a:rPr>
+              <a:t>Elie Kevin, </a:t>
+            </a:r>
+            <a:r>
+              <a:rPr lang="fr-FR" dirty="0" err="1">
+                <a:latin typeface="Bell MT" panose="02020503060305020303" pitchFamily="18" charset="0"/>
+              </a:rPr>
+              <a:t>Schlauder</a:t>
+            </a:r>
+            <a:r>
+              <a:rPr lang="fr-FR" dirty="0">
+                <a:latin typeface="Bell MT" panose="02020503060305020303" pitchFamily="18" charset="0"/>
+              </a:rPr>
+              <a:t> Laura, Maréchal Laure-Anne</a:t>
+            </a:r>
+          </a:p>
+        </p:txBody>
+      </p:sp>
     </p:spTree>
     <p:extLst>
       <p:ext uri="{BB962C8B-B14F-4D97-AF65-F5344CB8AC3E}">
@@ -3539,7 +4324,7 @@
         </p:nvSpPr>
         <p:spPr>
           <a:xfrm>
-            <a:off x="820550" y="8633"/>
+            <a:off x="802900" y="395360"/>
             <a:ext cx="5606754" cy="1078046"/>
           </a:xfrm>
         </p:spPr>
@@ -3584,8 +4369,8 @@
         </p:blipFill>
         <p:spPr bwMode="auto">
           <a:xfrm>
-            <a:off x="820550" y="1594058"/>
-            <a:ext cx="4772062" cy="1333106"/>
+            <a:off x="112558" y="1887192"/>
+            <a:ext cx="5819722" cy="1494798"/>
           </a:xfrm>
           <a:prstGeom prst="rect">
             <a:avLst/>
@@ -3625,8 +4410,8 @@
         </p:blipFill>
         <p:spPr bwMode="auto">
           <a:xfrm>
-            <a:off x="802900" y="3109901"/>
-            <a:ext cx="4789712" cy="3621489"/>
+            <a:off x="143998" y="3590707"/>
+            <a:ext cx="4438817" cy="3356178"/>
           </a:xfrm>
           <a:prstGeom prst="rect">
             <a:avLst/>
@@ -3651,7 +4436,7 @@
         </p:nvSpPr>
         <p:spPr>
           <a:xfrm>
-            <a:off x="820550" y="1167920"/>
+            <a:off x="99441" y="1312291"/>
             <a:ext cx="4483374" cy="400110"/>
           </a:xfrm>
           <a:prstGeom prst="rect">
@@ -3674,7 +4459,7 @@
       </p:sp>
       <p:pic>
         <p:nvPicPr>
-          <p:cNvPr id="12" name="Image 11"/>
+          <p:cNvPr id="17" name="Image 16"/>
           <p:cNvPicPr>
             <a:picLocks noChangeAspect="1"/>
           </p:cNvPicPr>
@@ -3694,17 +4479,89 @@
         </p:blipFill>
         <p:spPr>
           <a:xfrm>
-            <a:off x="6757565" y="1167920"/>
-            <a:ext cx="4824835" cy="2021863"/>
+            <a:off x="7043497" y="1086679"/>
+            <a:ext cx="3784145" cy="2618289"/>
           </a:xfrm>
           <a:prstGeom prst="rect">
             <a:avLst/>
           </a:prstGeom>
         </p:spPr>
       </p:pic>
+      <p:sp>
+        <p:nvSpPr>
+          <p:cNvPr id="18" name="ZoneTexte 17"/>
+          <p:cNvSpPr txBox="1"/>
+          <p:nvPr/>
+        </p:nvSpPr>
+        <p:spPr>
+          <a:xfrm>
+            <a:off x="6757565" y="686569"/>
+            <a:ext cx="4483374" cy="400110"/>
+          </a:xfrm>
+          <a:prstGeom prst="rect">
+            <a:avLst/>
+          </a:prstGeom>
+          <a:noFill/>
+        </p:spPr>
+        <p:txBody>
+          <a:bodyPr wrap="square" rtlCol="0">
+            <a:spAutoFit/>
+          </a:bodyPr>
+          <a:lstStyle/>
+          <a:p>
+            <a:r>
+              <a:rPr lang="fr-FR" sz="2000" dirty="0"/>
+              <a:t>Expérience 2 :</a:t>
+            </a:r>
+          </a:p>
+        </p:txBody>
+      </p:sp>
+      <p:sp>
+        <p:nvSpPr>
+          <p:cNvPr id="10" name="ZoneTexte 9"/>
+          <p:cNvSpPr txBox="1"/>
+          <p:nvPr/>
+        </p:nvSpPr>
+        <p:spPr>
+          <a:xfrm>
+            <a:off x="0" y="0"/>
+            <a:ext cx="5088835" cy="369332"/>
+          </a:xfrm>
+          <a:prstGeom prst="rect">
+            <a:avLst/>
+          </a:prstGeom>
+          <a:noFill/>
+        </p:spPr>
+        <p:txBody>
+          <a:bodyPr wrap="square" rtlCol="0">
+            <a:spAutoFit/>
+          </a:bodyPr>
+          <a:lstStyle/>
+          <a:p>
+            <a:r>
+              <a:rPr lang="fr-FR" dirty="0">
+                <a:latin typeface="Bell MT" panose="02020503060305020303" pitchFamily="18" charset="0"/>
+              </a:rPr>
+              <a:t>Elie Kevin, </a:t>
+            </a:r>
+            <a:r>
+              <a:rPr lang="fr-FR" dirty="0" err="1">
+                <a:latin typeface="Bell MT" panose="02020503060305020303" pitchFamily="18" charset="0"/>
+              </a:rPr>
+              <a:t>Schlauder</a:t>
+            </a:r>
+            <a:r>
+              <a:rPr lang="fr-FR" dirty="0">
+                <a:latin typeface="Bell MT" panose="02020503060305020303" pitchFamily="18" charset="0"/>
+              </a:rPr>
+              <a:t> Laura, Maréchal Laure-Anne</a:t>
+            </a:r>
+          </a:p>
+        </p:txBody>
+      </p:sp>
       <p:pic>
         <p:nvPicPr>
-          <p:cNvPr id="17" name="Image 16"/>
+          <p:cNvPr id="3" name="Image 2"/>
           <p:cNvPicPr>
             <a:picLocks noChangeAspect="1"/>
           </p:cNvPicPr>
@@ -3724,8 +4581,8 @@
         </p:blipFill>
         <p:spPr>
           <a:xfrm>
-            <a:off x="6757565" y="3259632"/>
-            <a:ext cx="5017641" cy="3471758"/>
+            <a:off x="6171414" y="3806203"/>
+            <a:ext cx="5876365" cy="2925187"/>
           </a:xfrm>
           <a:prstGeom prst="rect">
             <a:avLst/>
@@ -3734,14 +4591,14 @@
       </p:pic>
       <p:sp>
         <p:nvSpPr>
-          <p:cNvPr id="18" name="ZoneTexte 17"/>
+          <p:cNvPr id="4" name="ZoneTexte 3"/>
           <p:cNvSpPr txBox="1"/>
           <p:nvPr/>
         </p:nvSpPr>
         <p:spPr>
           <a:xfrm>
-            <a:off x="6757565" y="686569"/>
-            <a:ext cx="4483374" cy="400110"/>
+            <a:off x="10827642" y="1086679"/>
+            <a:ext cx="1364358" cy="646331"/>
           </a:xfrm>
           <a:prstGeom prst="rect">
             <a:avLst/>
@@ -3755,8 +4612,100 @@
           <a:lstStyle/>
           <a:p>
             <a:r>
-              <a:rPr lang="fr-FR" sz="2000" dirty="0"/>
-              <a:t>Expérience 2 :</a:t>
+              <a:rPr lang="fr-FR" i="1" dirty="0"/>
+              <a:t>Schéma du montage 2</a:t>
+            </a:r>
+          </a:p>
+        </p:txBody>
+      </p:sp>
+      <p:sp>
+        <p:nvSpPr>
+          <p:cNvPr id="5" name="ZoneTexte 4"/>
+          <p:cNvSpPr txBox="1"/>
+          <p:nvPr/>
+        </p:nvSpPr>
+        <p:spPr>
+          <a:xfrm>
+            <a:off x="9805182" y="5416062"/>
+            <a:ext cx="1927273" cy="646331"/>
+          </a:xfrm>
+          <a:prstGeom prst="rect">
+            <a:avLst/>
+          </a:prstGeom>
+          <a:noFill/>
+        </p:spPr>
+        <p:txBody>
+          <a:bodyPr wrap="square" rtlCol="0">
+            <a:spAutoFit/>
+          </a:bodyPr>
+          <a:lstStyle/>
+          <a:p>
+            <a:r>
+              <a:rPr lang="fr-FR" i="1" dirty="0"/>
+              <a:t>Résultats afficher sur </a:t>
+            </a:r>
+            <a:r>
+              <a:rPr lang="fr-FR" i="1" dirty="0" err="1"/>
+              <a:t>Processing</a:t>
+            </a:r>
+            <a:endParaRPr lang="fr-FR" i="1" dirty="0"/>
+          </a:p>
+        </p:txBody>
+      </p:sp>
+      <p:sp>
+        <p:nvSpPr>
+          <p:cNvPr id="6" name="ZoneTexte 5"/>
+          <p:cNvSpPr txBox="1"/>
+          <p:nvPr/>
+        </p:nvSpPr>
+        <p:spPr>
+          <a:xfrm>
+            <a:off x="1757374" y="1517860"/>
+            <a:ext cx="4600501" cy="369332"/>
+          </a:xfrm>
+          <a:prstGeom prst="rect">
+            <a:avLst/>
+          </a:prstGeom>
+          <a:noFill/>
+        </p:spPr>
+        <p:txBody>
+          <a:bodyPr wrap="square" rtlCol="0">
+            <a:spAutoFit/>
+          </a:bodyPr>
+          <a:lstStyle/>
+          <a:p>
+            <a:r>
+              <a:rPr lang="fr-FR" i="1" dirty="0"/>
+              <a:t>Oscillation lorsqu’on touche l’électrode ou non</a:t>
+            </a:r>
+          </a:p>
+        </p:txBody>
+      </p:sp>
+      <p:sp>
+        <p:nvSpPr>
+          <p:cNvPr id="7" name="ZoneTexte 6"/>
+          <p:cNvSpPr txBox="1"/>
+          <p:nvPr/>
+        </p:nvSpPr>
+        <p:spPr>
+          <a:xfrm>
+            <a:off x="3869861" y="4807131"/>
+            <a:ext cx="2062419" cy="923330"/>
+          </a:xfrm>
+          <a:prstGeom prst="rect">
+            <a:avLst/>
+          </a:prstGeom>
+          <a:noFill/>
+        </p:spPr>
+        <p:txBody>
+          <a:bodyPr wrap="square" rtlCol="0">
+            <a:spAutoFit/>
+          </a:bodyPr>
+          <a:lstStyle/>
+          <a:p>
+            <a:r>
+              <a:rPr lang="fr-FR" i="1" dirty="0"/>
+              <a:t>Evolution de la tension en fonction de la fréquence</a:t>
             </a:r>
           </a:p>
         </p:txBody>
@@ -3889,7 +4838,7 @@
           <p:nvPr/>
         </p:nvPicPr>
         <p:blipFill>
-          <a:blip r:embed="rId2">
+          <a:blip r:embed="rId3">
             <a:extLst>
               <a:ext uri="{28A0092B-C50C-407E-A947-70E740481C1C}">
                 <a14:useLocalDpi xmlns:a14="http://schemas.microsoft.com/office/drawing/2010/main" val="0"/>
@@ -3903,7 +4852,7 @@
         </p:blipFill>
         <p:spPr bwMode="auto">
           <a:xfrm>
-            <a:off x="838200" y="1834881"/>
+            <a:off x="421012" y="1874638"/>
             <a:ext cx="6155180" cy="3426435"/>
           </a:xfrm>
           <a:prstGeom prst="rect">
@@ -3930,7 +4879,7 @@
           <p:nvPr/>
         </p:nvPicPr>
         <p:blipFill>
-          <a:blip r:embed="rId3">
+          <a:blip r:embed="rId4">
             <a:extLst>
               <a:ext uri="{28A0092B-C50C-407E-A947-70E740481C1C}">
                 <a14:useLocalDpi xmlns:a14="http://schemas.microsoft.com/office/drawing/2010/main" val="0"/>
@@ -3944,7 +4893,7 @@
         </p:blipFill>
         <p:spPr bwMode="auto">
           <a:xfrm>
-            <a:off x="7410568" y="3941264"/>
+            <a:off x="7302227" y="3392880"/>
             <a:ext cx="4051573" cy="1942294"/>
           </a:xfrm>
           <a:prstGeom prst="rect">
@@ -3962,6 +4911,117 @@
           </a:extLst>
         </p:spPr>
       </p:pic>
+      <p:sp>
+        <p:nvSpPr>
+          <p:cNvPr id="6" name="ZoneTexte 5"/>
+          <p:cNvSpPr txBox="1"/>
+          <p:nvPr/>
+        </p:nvSpPr>
+        <p:spPr>
+          <a:xfrm>
+            <a:off x="0" y="0"/>
+            <a:ext cx="5088835" cy="369332"/>
+          </a:xfrm>
+          <a:prstGeom prst="rect">
+            <a:avLst/>
+          </a:prstGeom>
+          <a:noFill/>
+        </p:spPr>
+        <p:txBody>
+          <a:bodyPr wrap="square" rtlCol="0">
+            <a:spAutoFit/>
+          </a:bodyPr>
+          <a:lstStyle/>
+          <a:p>
+            <a:r>
+              <a:rPr lang="fr-FR" dirty="0">
+                <a:latin typeface="Bell MT" panose="02020503060305020303" pitchFamily="18" charset="0"/>
+              </a:rPr>
+              <a:t>Elie Kevin, </a:t>
+            </a:r>
+            <a:r>
+              <a:rPr lang="fr-FR" dirty="0" err="1">
+                <a:latin typeface="Bell MT" panose="02020503060305020303" pitchFamily="18" charset="0"/>
+              </a:rPr>
+              <a:t>Schlauder</a:t>
+            </a:r>
+            <a:r>
+              <a:rPr lang="fr-FR" dirty="0">
+                <a:latin typeface="Bell MT" panose="02020503060305020303" pitchFamily="18" charset="0"/>
+              </a:rPr>
+              <a:t> Laura, Maréchal Laure-Anne</a:t>
+            </a:r>
+          </a:p>
+        </p:txBody>
+      </p:sp>
+      <p:sp>
+        <p:nvSpPr>
+          <p:cNvPr id="3" name="ZoneTexte 2"/>
+          <p:cNvSpPr txBox="1"/>
+          <p:nvPr/>
+        </p:nvSpPr>
+        <p:spPr>
+          <a:xfrm>
+            <a:off x="421012" y="5335174"/>
+            <a:ext cx="6155180" cy="369332"/>
+          </a:xfrm>
+          <a:prstGeom prst="rect">
+            <a:avLst/>
+          </a:prstGeom>
+          <a:noFill/>
+        </p:spPr>
+        <p:txBody>
+          <a:bodyPr wrap="square" rtlCol="0">
+            <a:spAutoFit/>
+          </a:bodyPr>
+          <a:lstStyle/>
+          <a:p>
+            <a:r>
+              <a:rPr lang="fr-FR" i="1" dirty="0"/>
+              <a:t>Vue schématique sur </a:t>
+            </a:r>
+            <a:r>
+              <a:rPr lang="fr-FR" i="1" dirty="0" err="1"/>
+              <a:t>Fritzing</a:t>
+            </a:r>
+            <a:endParaRPr lang="fr-FR" i="1" dirty="0"/>
+          </a:p>
+        </p:txBody>
+      </p:sp>
+      <p:sp>
+        <p:nvSpPr>
+          <p:cNvPr id="4" name="ZoneTexte 3"/>
+          <p:cNvSpPr txBox="1"/>
+          <p:nvPr/>
+        </p:nvSpPr>
+        <p:spPr>
+          <a:xfrm>
+            <a:off x="7302227" y="5335174"/>
+            <a:ext cx="3023459" cy="369332"/>
+          </a:xfrm>
+          <a:prstGeom prst="rect">
+            <a:avLst/>
+          </a:prstGeom>
+          <a:noFill/>
+        </p:spPr>
+        <p:txBody>
+          <a:bodyPr wrap="square" rtlCol="0">
+            <a:spAutoFit/>
+          </a:bodyPr>
+          <a:lstStyle/>
+          <a:p>
+            <a:r>
+              <a:rPr lang="fr-FR" i="1" dirty="0"/>
+              <a:t>Platine d’essai sur </a:t>
+            </a:r>
+            <a:r>
+              <a:rPr lang="fr-FR" i="1" dirty="0" err="1"/>
+              <a:t>Fritzing</a:t>
+            </a:r>
+            <a:endParaRPr lang="fr-FR" i="1" dirty="0"/>
+          </a:p>
+        </p:txBody>
+      </p:sp>
     </p:spTree>
     <p:extLst>
       <p:ext uri="{BB962C8B-B14F-4D97-AF65-F5344CB8AC3E}">
@@ -4055,47 +5115,226 @@
           </a:p>
         </p:txBody>
       </p:sp>
+      <p:sp>
+        <p:nvSpPr>
+          <p:cNvPr id="4" name="ZoneTexte 3"/>
+          <p:cNvSpPr txBox="1"/>
+          <p:nvPr/>
+        </p:nvSpPr>
+        <p:spPr>
+          <a:xfrm>
+            <a:off x="0" y="0"/>
+            <a:ext cx="5088835" cy="369332"/>
+          </a:xfrm>
+          <a:prstGeom prst="rect">
+            <a:avLst/>
+          </a:prstGeom>
+          <a:noFill/>
+        </p:spPr>
+        <p:txBody>
+          <a:bodyPr wrap="square" rtlCol="0">
+            <a:spAutoFit/>
+          </a:bodyPr>
+          <a:lstStyle/>
+          <a:p>
+            <a:r>
+              <a:rPr lang="fr-FR" dirty="0">
+                <a:latin typeface="Bell MT" panose="02020503060305020303" pitchFamily="18" charset="0"/>
+              </a:rPr>
+              <a:t>Elie Kevin, </a:t>
+            </a:r>
+            <a:r>
+              <a:rPr lang="fr-FR" dirty="0" err="1">
+                <a:latin typeface="Bell MT" panose="02020503060305020303" pitchFamily="18" charset="0"/>
+              </a:rPr>
+              <a:t>Schlauder</a:t>
+            </a:r>
+            <a:r>
+              <a:rPr lang="fr-FR" dirty="0">
+                <a:latin typeface="Bell MT" panose="02020503060305020303" pitchFamily="18" charset="0"/>
+              </a:rPr>
+              <a:t> Laura, Maréchal Laure-Anne</a:t>
+            </a:r>
+          </a:p>
+        </p:txBody>
+      </p:sp>
       <p:pic>
         <p:nvPicPr>
-          <p:cNvPr id="3074" name="Picture 2" descr="avec_la_patate__1024.jpg"/>
+          <p:cNvPr id="3" name="Image 2"/>
           <p:cNvPicPr>
-            <a:picLocks noChangeAspect="1" noChangeArrowheads="1"/>
+            <a:picLocks noChangeAspect="1"/>
           </p:cNvPicPr>
           <p:nvPr/>
         </p:nvPicPr>
         <p:blipFill>
-          <a:blip r:embed="rId2">
+          <a:blip r:embed="rId3">
             <a:extLst>
               <a:ext uri="{28A0092B-C50C-407E-A947-70E740481C1C}">
                 <a14:useLocalDpi xmlns:a14="http://schemas.microsoft.com/office/drawing/2010/main" val="0"/>
               </a:ext>
             </a:extLst>
           </a:blip>
-          <a:srcRect/>
           <a:stretch>
             <a:fillRect/>
           </a:stretch>
         </p:blipFill>
-        <p:spPr bwMode="auto">
-          <a:xfrm>
-            <a:off x="978041" y="1690688"/>
-            <a:ext cx="4421505" cy="3820180"/>
+        <p:spPr>
+          <a:xfrm>
+            <a:off x="108876" y="2380129"/>
+            <a:ext cx="3735812" cy="2734407"/>
+          </a:xfrm>
+          <a:prstGeom prst="rect">
+            <a:avLst/>
+          </a:prstGeom>
+        </p:spPr>
+      </p:pic>
+      <p:pic>
+        <p:nvPicPr>
+          <p:cNvPr id="5" name="Image 4"/>
+          <p:cNvPicPr>
+            <a:picLocks noChangeAspect="1"/>
+          </p:cNvPicPr>
+          <p:nvPr/>
+        </p:nvPicPr>
+        <p:blipFill>
+          <a:blip r:embed="rId4">
+            <a:extLst>
+              <a:ext uri="{28A0092B-C50C-407E-A947-70E740481C1C}">
+                <a14:useLocalDpi xmlns:a14="http://schemas.microsoft.com/office/drawing/2010/main" val="0"/>
+              </a:ext>
+            </a:extLst>
+          </a:blip>
+          <a:stretch>
+            <a:fillRect/>
+          </a:stretch>
+        </p:blipFill>
+        <p:spPr>
+          <a:xfrm>
+            <a:off x="4237961" y="2380129"/>
+            <a:ext cx="3813617" cy="2734407"/>
+          </a:xfrm>
+          <a:prstGeom prst="rect">
+            <a:avLst/>
+          </a:prstGeom>
+        </p:spPr>
+      </p:pic>
+      <p:pic>
+        <p:nvPicPr>
+          <p:cNvPr id="6" name="Image 5"/>
+          <p:cNvPicPr>
+            <a:picLocks noChangeAspect="1"/>
+          </p:cNvPicPr>
+          <p:nvPr/>
+        </p:nvPicPr>
+        <p:blipFill>
+          <a:blip r:embed="rId5">
+            <a:extLst>
+              <a:ext uri="{28A0092B-C50C-407E-A947-70E740481C1C}">
+                <a14:useLocalDpi xmlns:a14="http://schemas.microsoft.com/office/drawing/2010/main" val="0"/>
+              </a:ext>
+            </a:extLst>
+          </a:blip>
+          <a:stretch>
+            <a:fillRect/>
+          </a:stretch>
+        </p:blipFill>
+        <p:spPr>
+          <a:xfrm>
+            <a:off x="8427665" y="2380129"/>
+            <a:ext cx="3518647" cy="2699438"/>
+          </a:xfrm>
+          <a:prstGeom prst="rect">
+            <a:avLst/>
+          </a:prstGeom>
+        </p:spPr>
+      </p:pic>
+      <p:sp>
+        <p:nvSpPr>
+          <p:cNvPr id="7" name="ZoneTexte 6"/>
+          <p:cNvSpPr txBox="1"/>
+          <p:nvPr/>
+        </p:nvSpPr>
+        <p:spPr>
+          <a:xfrm>
+            <a:off x="108876" y="5247249"/>
+            <a:ext cx="3735812" cy="646331"/>
           </a:xfrm>
           <a:prstGeom prst="rect">
             <a:avLst/>
           </a:prstGeom>
           <a:noFill/>
-          <a:extLst>
-            <a:ext uri="{909E8E84-426E-40DD-AFC4-6F175D3DCCD1}">
-              <a14:hiddenFill xmlns:a14="http://schemas.microsoft.com/office/drawing/2010/main">
-                <a:solidFill>
-                  <a:srgbClr val="FFFFFF"/>
-                </a:solidFill>
-              </a14:hiddenFill>
-            </a:ext>
-          </a:extLst>
-        </p:spPr>
-      </p:pic>
+        </p:spPr>
+        <p:txBody>
+          <a:bodyPr wrap="square" rtlCol="0">
+            <a:spAutoFit/>
+          </a:bodyPr>
+          <a:lstStyle/>
+          <a:p>
+            <a:r>
+              <a:rPr lang="fr-FR" i="1" dirty="0"/>
+              <a:t>On ne touche pas la patate, la LED est éteinte.</a:t>
+            </a:r>
+          </a:p>
+        </p:txBody>
+      </p:sp>
+      <p:sp>
+        <p:nvSpPr>
+          <p:cNvPr id="8" name="ZoneTexte 7"/>
+          <p:cNvSpPr txBox="1"/>
+          <p:nvPr/>
+        </p:nvSpPr>
+        <p:spPr>
+          <a:xfrm>
+            <a:off x="4237961" y="5247249"/>
+            <a:ext cx="3813617" cy="646331"/>
+          </a:xfrm>
+          <a:prstGeom prst="rect">
+            <a:avLst/>
+          </a:prstGeom>
+          <a:noFill/>
+        </p:spPr>
+        <p:txBody>
+          <a:bodyPr wrap="square" rtlCol="0">
+            <a:spAutoFit/>
+          </a:bodyPr>
+          <a:lstStyle/>
+          <a:p>
+            <a:r>
+              <a:rPr lang="fr-FR" i="1" dirty="0"/>
+              <a:t>On touche la pomme de terre avec un doigt, le LED s’allume. </a:t>
+            </a:r>
+          </a:p>
+        </p:txBody>
+      </p:sp>
+      <p:sp>
+        <p:nvSpPr>
+          <p:cNvPr id="9" name="ZoneTexte 8"/>
+          <p:cNvSpPr txBox="1"/>
+          <p:nvPr/>
+        </p:nvSpPr>
+        <p:spPr>
+          <a:xfrm>
+            <a:off x="8427665" y="5114536"/>
+            <a:ext cx="3518647" cy="646331"/>
+          </a:xfrm>
+          <a:prstGeom prst="rect">
+            <a:avLst/>
+          </a:prstGeom>
+          <a:noFill/>
+        </p:spPr>
+        <p:txBody>
+          <a:bodyPr wrap="square" rtlCol="0">
+            <a:spAutoFit/>
+          </a:bodyPr>
+          <a:lstStyle/>
+          <a:p>
+            <a:r>
+              <a:rPr lang="fr-FR" i="1" dirty="0"/>
+              <a:t>On touche le tubercule à deux doigt, la LED reste allumée.</a:t>
+            </a:r>
+          </a:p>
+        </p:txBody>
+      </p:sp>
     </p:spTree>
     <p:extLst>
       <p:ext uri="{BB962C8B-B14F-4D97-AF65-F5344CB8AC3E}">
@@ -4184,6 +5423,105 @@
                 <a:latin typeface="Californian FB" panose="0207040306080B030204" pitchFamily="18" charset="0"/>
               </a:rPr>
               <a:t>Bilan du projet</a:t>
+            </a:r>
+          </a:p>
+        </p:txBody>
+      </p:sp>
+      <p:sp>
+        <p:nvSpPr>
+          <p:cNvPr id="3" name="ZoneTexte 2"/>
+          <p:cNvSpPr txBox="1"/>
+          <p:nvPr/>
+        </p:nvSpPr>
+        <p:spPr>
+          <a:xfrm>
+            <a:off x="0" y="0"/>
+            <a:ext cx="5088835" cy="369332"/>
+          </a:xfrm>
+          <a:prstGeom prst="rect">
+            <a:avLst/>
+          </a:prstGeom>
+          <a:noFill/>
+        </p:spPr>
+        <p:txBody>
+          <a:bodyPr wrap="square" rtlCol="0">
+            <a:spAutoFit/>
+          </a:bodyPr>
+          <a:lstStyle/>
+          <a:p>
+            <a:r>
+              <a:rPr lang="fr-FR" dirty="0">
+                <a:latin typeface="Bell MT" panose="02020503060305020303" pitchFamily="18" charset="0"/>
+              </a:rPr>
+              <a:t>Elie Kevin, </a:t>
+            </a:r>
+            <a:r>
+              <a:rPr lang="fr-FR" dirty="0" err="1">
+                <a:latin typeface="Bell MT" panose="02020503060305020303" pitchFamily="18" charset="0"/>
+              </a:rPr>
+              <a:t>Schlauder</a:t>
+            </a:r>
+            <a:r>
+              <a:rPr lang="fr-FR" dirty="0">
+                <a:latin typeface="Bell MT" panose="02020503060305020303" pitchFamily="18" charset="0"/>
+              </a:rPr>
+              <a:t> Laura, Maréchal Laure-Anne</a:t>
+            </a:r>
+          </a:p>
+        </p:txBody>
+      </p:sp>
+      <p:sp>
+        <p:nvSpPr>
+          <p:cNvPr id="4" name="ZoneTexte 3"/>
+          <p:cNvSpPr txBox="1"/>
+          <p:nvPr/>
+        </p:nvSpPr>
+        <p:spPr>
+          <a:xfrm>
+            <a:off x="1722783" y="2425148"/>
+            <a:ext cx="11171583" cy="1754326"/>
+          </a:xfrm>
+          <a:prstGeom prst="rect">
+            <a:avLst/>
+          </a:prstGeom>
+          <a:noFill/>
+        </p:spPr>
+        <p:txBody>
+          <a:bodyPr wrap="square" rtlCol="0">
+            <a:spAutoFit/>
+          </a:bodyPr>
+          <a:lstStyle/>
+          <a:p>
+            <a:pPr marL="285750" indent="-285750">
+              <a:buFontTx/>
+              <a:buChar char="-"/>
+            </a:pPr>
+            <a:r>
+              <a:rPr lang="fr-FR" sz="3600" dirty="0">
+                <a:latin typeface="Bell MT" panose="02020503060305020303" pitchFamily="18" charset="0"/>
+              </a:rPr>
+              <a:t>Retour sur le projet </a:t>
+            </a:r>
+          </a:p>
+          <a:p>
+            <a:pPr marL="285750" indent="-285750">
+              <a:buFontTx/>
+              <a:buChar char="-"/>
+            </a:pPr>
+            <a:endParaRPr lang="fr-FR" sz="3600" dirty="0">
+              <a:latin typeface="Bell MT" panose="02020503060305020303" pitchFamily="18" charset="0"/>
+            </a:endParaRPr>
+          </a:p>
+          <a:p>
+            <a:pPr marL="285750" indent="-285750">
+              <a:buFontTx/>
+              <a:buChar char="-"/>
+            </a:pPr>
+            <a:r>
+              <a:rPr lang="fr-FR" sz="3600" dirty="0">
+                <a:latin typeface="Bell MT" panose="02020503060305020303" pitchFamily="18" charset="0"/>
+              </a:rPr>
+              <a:t>Retour sur le travail en groupe </a:t>
             </a:r>
           </a:p>
         </p:txBody>
@@ -4494,4 +5832,594 @@
     </a:ext>
   </a:extLst>
 </a:theme>
+</file>
+
+<file path=ppt/theme/theme2.xml><?xml version="1.0" encoding="utf-8"?>
+<a:theme xmlns:a="http://schemas.openxmlformats.org/drawingml/2006/main" name="Thème Office">
+  <a:themeElements>
+    <a:clrScheme name="Office">
+      <a:dk1>
+        <a:sysClr val="windowText" lastClr="000000"/>
+      </a:dk1>
+      <a:lt1>
+        <a:sysClr val="window" lastClr="FFFFFF"/>
+      </a:lt1>
+      <a:dk2>
+        <a:srgbClr val="44546A"/>
+      </a:dk2>
+      <a:lt2>
+        <a:srgbClr val="E7E6E6"/>
+      </a:lt2>
+      <a:accent1>
+        <a:srgbClr val="5B9BD5"/>
+      </a:accent1>
+      <a:accent2>
+        <a:srgbClr val="ED7D31"/>
+      </a:accent2>
+      <a:accent3>
+        <a:srgbClr val="A5A5A5"/>
+      </a:accent3>
+      <a:accent4>
+        <a:srgbClr val="FFC000"/>
+      </a:accent4>
+      <a:accent5>
+        <a:srgbClr val="4472C4"/>
+      </a:accent5>
+      <a:accent6>
+        <a:srgbClr val="70AD47"/>
+      </a:accent6>
+      <a:hlink>
+        <a:srgbClr val="0563C1"/>
+      </a:hlink>
+      <a:folHlink>
+        <a:srgbClr val="954F72"/>
+      </a:folHlink>
+    </a:clrScheme>
+    <a:fontScheme name="Office">
+      <a:majorFont>
+        <a:latin typeface="Calibri Light" panose="020F0302020204030204"/>
+        <a:ea typeface=""/>
+        <a:cs typeface=""/>
+        <a:font script="Jpan" typeface="游ゴシック Light"/>
+        <a:font script="Hang" typeface="맑은 고딕"/>
+        <a:font script="Hans" typeface="等线 Light"/>
+        <a:font script="Hant" typeface="新細明體"/>
+        <a:font script="Arab" typeface="Times New Roman"/>
+        <a:font script="Hebr" typeface="Times New Roman"/>
+        <a:font script="Thai" typeface="Angsana New"/>
+        <a:font script="Ethi" typeface="Nyala"/>
+        <a:font script="Beng" typeface="Vrinda"/>
+        <a:font script="Gujr" typeface="Shruti"/>
+        <a:font script="Khmr" typeface="MoolBoran"/>
+        <a:font script="Knda" typeface="Tunga"/>
+        <a:font script="Guru" typeface="Raavi"/>
+        <a:font script="Cans" typeface="Euphemia"/>
+        <a:font script="Cher" typeface="Plantagenet Cherokee"/>
+        <a:font script="Yiii" typeface="Microsoft Yi Baiti"/>
+        <a:font script="Tibt" typeface="Microsoft Himalaya"/>
+        <a:font script="Thaa" typeface="MV Boli"/>
+        <a:font script="Deva" typeface="Mangal"/>
+        <a:font script="Telu" typeface="Gautami"/>
+        <a:font script="Taml" typeface="Latha"/>
+        <a:font script="Syrc" typeface="Estrangelo Edessa"/>
+        <a:font script="Orya" typeface="Kalinga"/>
+        <a:font script="Mlym" typeface="Kartika"/>
+        <a:font script="Laoo" typeface="DokChampa"/>
+        <a:font script="Sinh" typeface="Iskoola Pota"/>
+        <a:font script="Mong" typeface="Mongolian Baiti"/>
+        <a:font script="Viet" typeface="Times New Roman"/>
+        <a:font script="Uigh" typeface="Microsoft Uighur"/>
+        <a:font script="Geor" typeface="Sylfaen"/>
+        <a:font script="Armn" typeface="Arial"/>
+        <a:font script="Bugi" typeface="Leelawadee UI"/>
+        <a:font script="Bopo" typeface="Microsoft JhengHei"/>
+        <a:font script="Java" typeface="Javanese Text"/>
+        <a:font script="Lisu" typeface="Segoe UI"/>
+        <a:font script="Mymr" typeface="Myanmar Text"/>
+        <a:font script="Nkoo" typeface="Ebrima"/>
+        <a:font script="Olck" typeface="Nirmala UI"/>
+        <a:font script="Osma" typeface="Ebrima"/>
+        <a:font script="Phag" typeface="Phagspa"/>
+        <a:font script="Syrn" typeface="Estrangelo Edessa"/>
+        <a:font script="Syrj" typeface="Estrangelo Edessa"/>
+        <a:font script="Syre" typeface="Estrangelo Edessa"/>
+        <a:font script="Sora" typeface="Nirmala UI"/>
+        <a:font script="Tale" typeface="Microsoft Tai Le"/>
+        <a:font script="Talu" typeface="Microsoft New Tai Lue"/>
+        <a:font script="Tfng" typeface="Ebrima"/>
+      </a:majorFont>
+      <a:minorFont>
+        <a:latin typeface="Calibri" panose="020F0502020204030204"/>
+        <a:ea typeface=""/>
+        <a:cs typeface=""/>
+        <a:font script="Jpan" typeface="游ゴシック"/>
+        <a:font script="Hang" typeface="맑은 고딕"/>
+        <a:font script="Hans" typeface="等线"/>
+        <a:font script="Hant" typeface="新細明體"/>
+        <a:font script="Arab" typeface="Arial"/>
+        <a:font script="Hebr" typeface="Arial"/>
+        <a:font script="Thai" typeface="Cordia New"/>
+        <a:font script="Ethi" typeface="Nyala"/>
+        <a:font script="Beng" typeface="Vrinda"/>
+        <a:font script="Gujr" typeface="Shruti"/>
+        <a:font script="Khmr" typeface="DaunPenh"/>
+        <a:font script="Knda" typeface="Tunga"/>
+        <a:font script="Guru" typeface="Raavi"/>
+        <a:font script="Cans" typeface="Euphemia"/>
+        <a:font script="Cher" typeface="Plantagenet Cherokee"/>
+        <a:font script="Yiii" typeface="Microsoft Yi Baiti"/>
+        <a:font script="Tibt" typeface="Microsoft Himalaya"/>
+        <a:font script="Thaa" typeface="MV Boli"/>
+        <a:font script="Deva" typeface="Mangal"/>
+        <a:font script="Telu" typeface="Gautami"/>
+        <a:font script="Taml" typeface="Latha"/>
+        <a:font script="Syrc" typeface="Estrangelo Edessa"/>
+        <a:font script="Orya" typeface="Kalinga"/>
+        <a:font script="Mlym" typeface="Kartika"/>
+        <a:font script="Laoo" typeface="DokChampa"/>
+        <a:font script="Sinh" typeface="Iskoola Pota"/>
+        <a:font script="Mong" typeface="Mongolian Baiti"/>
+        <a:font script="Viet" typeface="Arial"/>
+        <a:font script="Uigh" typeface="Microsoft Uighur"/>
+        <a:font script="Geor" typeface="Sylfaen"/>
+        <a:font script="Armn" typeface="Arial"/>
+        <a:font script="Bugi" typeface="Leelawadee UI"/>
+        <a:font script="Bopo" typeface="Microsoft JhengHei"/>
+        <a:font script="Java" typeface="Javanese Text"/>
+        <a:font script="Lisu" typeface="Segoe UI"/>
+        <a:font script="Mymr" typeface="Myanmar Text"/>
+        <a:font script="Nkoo" typeface="Ebrima"/>
+        <a:font script="Olck" typeface="Nirmala UI"/>
+        <a:font script="Osma" typeface="Ebrima"/>
+        <a:font script="Phag" typeface="Phagspa"/>
+        <a:font script="Syrn" typeface="Estrangelo Edessa"/>
+        <a:font script="Syrj" typeface="Estrangelo Edessa"/>
+        <a:font script="Syre" typeface="Estrangelo Edessa"/>
+        <a:font script="Sora" typeface="Nirmala UI"/>
+        <a:font script="Tale" typeface="Microsoft Tai Le"/>
+        <a:font script="Talu" typeface="Microsoft New Tai Lue"/>
+        <a:font script="Tfng" typeface="Ebrima"/>
+      </a:minorFont>
+    </a:fontScheme>
+    <a:fmtScheme name="Office">
+      <a:fillStyleLst>
+        <a:solidFill>
+          <a:schemeClr val="phClr"/>
+        </a:solidFill>
+        <a:gradFill rotWithShape="1">
+          <a:gsLst>
+            <a:gs pos="0">
+              <a:schemeClr val="phClr">
+                <a:lumMod val="110000"/>
+                <a:satMod val="105000"/>
+                <a:tint val="67000"/>
+              </a:schemeClr>
+            </a:gs>
+            <a:gs pos="50000">
+              <a:schemeClr val="phClr">
+                <a:lumMod val="105000"/>
+                <a:satMod val="103000"/>
+                <a:tint val="73000"/>
+              </a:schemeClr>
+            </a:gs>
+            <a:gs pos="100000">
+              <a:schemeClr val="phClr">
+                <a:lumMod val="105000"/>
+                <a:satMod val="109000"/>
+                <a:tint val="81000"/>
+              </a:schemeClr>
+            </a:gs>
+          </a:gsLst>
+          <a:lin ang="5400000" scaled="0"/>
+        </a:gradFill>
+        <a:gradFill rotWithShape="1">
+          <a:gsLst>
+            <a:gs pos="0">
+              <a:schemeClr val="phClr">
+                <a:satMod val="103000"/>
+                <a:lumMod val="102000"/>
+                <a:tint val="94000"/>
+              </a:schemeClr>
+            </a:gs>
+            <a:gs pos="50000">
+              <a:schemeClr val="phClr">
+                <a:satMod val="110000"/>
+                <a:lumMod val="100000"/>
+                <a:shade val="100000"/>
+              </a:schemeClr>
+            </a:gs>
+            <a:gs pos="100000">
+              <a:schemeClr val="phClr">
+                <a:lumMod val="99000"/>
+                <a:satMod val="120000"/>
+                <a:shade val="78000"/>
+              </a:schemeClr>
+            </a:gs>
+          </a:gsLst>
+          <a:lin ang="5400000" scaled="0"/>
+        </a:gradFill>
+      </a:fillStyleLst>
+      <a:lnStyleLst>
+        <a:ln w="6350" cap="flat" cmpd="sng" algn="ctr">
+          <a:solidFill>
+            <a:schemeClr val="phClr"/>
+          </a:solidFill>
+          <a:prstDash val="solid"/>
+          <a:miter lim="800000"/>
+        </a:ln>
+        <a:ln w="12700" cap="flat" cmpd="sng" algn="ctr">
+          <a:solidFill>
+            <a:schemeClr val="phClr"/>
+          </a:solidFill>
+          <a:prstDash val="solid"/>
+          <a:miter lim="800000"/>
+        </a:ln>
+        <a:ln w="19050" cap="flat" cmpd="sng" algn="ctr">
+          <a:solidFill>
+            <a:schemeClr val="phClr"/>
+          </a:solidFill>
+          <a:prstDash val="solid"/>
+          <a:miter lim="800000"/>
+        </a:ln>
+      </a:lnStyleLst>
+      <a:effectStyleLst>
+        <a:effectStyle>
+          <a:effectLst/>
+        </a:effectStyle>
+        <a:effectStyle>
+          <a:effectLst/>
+        </a:effectStyle>
+        <a:effectStyle>
+          <a:effectLst>
+            <a:outerShdw blurRad="57150" dist="19050" dir="5400000" algn="ctr" rotWithShape="0">
+              <a:srgbClr val="000000">
+                <a:alpha val="63000"/>
+              </a:srgbClr>
+            </a:outerShdw>
+          </a:effectLst>
+        </a:effectStyle>
+      </a:effectStyleLst>
+      <a:bgFillStyleLst>
+        <a:solidFill>
+          <a:schemeClr val="phClr"/>
+        </a:solidFill>
+        <a:solidFill>
+          <a:schemeClr val="phClr">
+            <a:tint val="95000"/>
+            <a:satMod val="170000"/>
+          </a:schemeClr>
+        </a:solidFill>
+        <a:gradFill rotWithShape="1">
+          <a:gsLst>
+            <a:gs pos="0">
+              <a:schemeClr val="phClr">
+                <a:tint val="93000"/>
+                <a:satMod val="150000"/>
+                <a:shade val="98000"/>
+                <a:lumMod val="102000"/>
+              </a:schemeClr>
+            </a:gs>
+            <a:gs pos="50000">
+              <a:schemeClr val="phClr">
+                <a:tint val="98000"/>
+                <a:satMod val="130000"/>
+                <a:shade val="90000"/>
+                <a:lumMod val="103000"/>
+              </a:schemeClr>
+            </a:gs>
+            <a:gs pos="100000">
+              <a:schemeClr val="phClr">
+                <a:shade val="63000"/>
+                <a:satMod val="120000"/>
+              </a:schemeClr>
+            </a:gs>
+          </a:gsLst>
+          <a:lin ang="5400000" scaled="0"/>
+        </a:gradFill>
+      </a:bgFillStyleLst>
+    </a:fmtScheme>
+  </a:themeElements>
+  <a:objectDefaults/>
+  <a:extraClrSchemeLst/>
+  <a:extLst>
+    <a:ext uri="{05A4C25C-085E-4340-85A3-A5531E510DB2}">
+      <thm15:themeFamily xmlns:thm15="http://schemas.microsoft.com/office/thememl/2012/main" name="Office Theme" id="{62F939B6-93AF-4DB8-9C6B-D6C7DFDC589F}" vid="{4A3C46E8-61CC-4603-A589-7422A47A8E4A}"/>
+    </a:ext>
+  </a:extLst>
+</a:theme>
+</file>
+
+<file path=ppt/theme/theme3.xml><?xml version="1.0" encoding="utf-8"?>
+<a:theme xmlns:a="http://schemas.openxmlformats.org/drawingml/2006/main" name="Thème Office">
+  <a:themeElements>
+    <a:clrScheme name="Office">
+      <a:dk1>
+        <a:sysClr val="windowText" lastClr="000000"/>
+      </a:dk1>
+      <a:lt1>
+        <a:sysClr val="window" lastClr="FFFFFF"/>
+      </a:lt1>
+      <a:dk2>
+        <a:srgbClr val="44546A"/>
+      </a:dk2>
+      <a:lt2>
+        <a:srgbClr val="E7E6E6"/>
+      </a:lt2>
+      <a:accent1>
+        <a:srgbClr val="5B9BD5"/>
+      </a:accent1>
+      <a:accent2>
+        <a:srgbClr val="ED7D31"/>
+      </a:accent2>
+      <a:accent3>
+        <a:srgbClr val="A5A5A5"/>
+      </a:accent3>
+      <a:accent4>
+        <a:srgbClr val="FFC000"/>
+      </a:accent4>
+      <a:accent5>
+        <a:srgbClr val="4472C4"/>
+      </a:accent5>
+      <a:accent6>
+        <a:srgbClr val="70AD47"/>
+      </a:accent6>
+      <a:hlink>
+        <a:srgbClr val="0563C1"/>
+      </a:hlink>
+      <a:folHlink>
+        <a:srgbClr val="954F72"/>
+      </a:folHlink>
+    </a:clrScheme>
+    <a:fontScheme name="Office">
+      <a:majorFont>
+        <a:latin typeface="Calibri Light" panose="020F0302020204030204"/>
+        <a:ea typeface=""/>
+        <a:cs typeface=""/>
+        <a:font script="Jpan" typeface="游ゴシック Light"/>
+        <a:font script="Hang" typeface="맑은 고딕"/>
+        <a:font script="Hans" typeface="等线 Light"/>
+        <a:font script="Hant" typeface="新細明體"/>
+        <a:font script="Arab" typeface="Times New Roman"/>
+        <a:font script="Hebr" typeface="Times New Roman"/>
+        <a:font script="Thai" typeface="Angsana New"/>
+        <a:font script="Ethi" typeface="Nyala"/>
+        <a:font script="Beng" typeface="Vrinda"/>
+        <a:font script="Gujr" typeface="Shruti"/>
+        <a:font script="Khmr" typeface="MoolBoran"/>
+        <a:font script="Knda" typeface="Tunga"/>
+        <a:font script="Guru" typeface="Raavi"/>
+        <a:font script="Cans" typeface="Euphemia"/>
+        <a:font script="Cher" typeface="Plantagenet Cherokee"/>
+        <a:font script="Yiii" typeface="Microsoft Yi Baiti"/>
+        <a:font script="Tibt" typeface="Microsoft Himalaya"/>
+        <a:font script="Thaa" typeface="MV Boli"/>
+        <a:font script="Deva" typeface="Mangal"/>
+        <a:font script="Telu" typeface="Gautami"/>
+        <a:font script="Taml" typeface="Latha"/>
+        <a:font script="Syrc" typeface="Estrangelo Edessa"/>
+        <a:font script="Orya" typeface="Kalinga"/>
+        <a:font script="Mlym" typeface="Kartika"/>
+        <a:font script="Laoo" typeface="DokChampa"/>
+        <a:font script="Sinh" typeface="Iskoola Pota"/>
+        <a:font script="Mong" typeface="Mongolian Baiti"/>
+        <a:font script="Viet" typeface="Times New Roman"/>
+        <a:font script="Uigh" typeface="Microsoft Uighur"/>
+        <a:font script="Geor" typeface="Sylfaen"/>
+        <a:font script="Armn" typeface="Arial"/>
+        <a:font script="Bugi" typeface="Leelawadee UI"/>
+        <a:font script="Bopo" typeface="Microsoft JhengHei"/>
+        <a:font script="Java" typeface="Javanese Text"/>
+        <a:font script="Lisu" typeface="Segoe UI"/>
+        <a:font script="Mymr" typeface="Myanmar Text"/>
+        <a:font script="Nkoo" typeface="Ebrima"/>
+        <a:font script="Olck" typeface="Nirmala UI"/>
+        <a:font script="Osma" typeface="Ebrima"/>
+        <a:font script="Phag" typeface="Phagspa"/>
+        <a:font script="Syrn" typeface="Estrangelo Edessa"/>
+        <a:font script="Syrj" typeface="Estrangelo Edessa"/>
+        <a:font script="Syre" typeface="Estrangelo Edessa"/>
+        <a:font script="Sora" typeface="Nirmala UI"/>
+        <a:font script="Tale" typeface="Microsoft Tai Le"/>
+        <a:font script="Talu" typeface="Microsoft New Tai Lue"/>
+        <a:font script="Tfng" typeface="Ebrima"/>
+      </a:majorFont>
+      <a:minorFont>
+        <a:latin typeface="Calibri" panose="020F0502020204030204"/>
+        <a:ea typeface=""/>
+        <a:cs typeface=""/>
+        <a:font script="Jpan" typeface="游ゴシック"/>
+        <a:font script="Hang" typeface="맑은 고딕"/>
+        <a:font script="Hans" typeface="等线"/>
+        <a:font script="Hant" typeface="新細明體"/>
+        <a:font script="Arab" typeface="Arial"/>
+        <a:font script="Hebr" typeface="Arial"/>
+        <a:font script="Thai" typeface="Cordia New"/>
+        <a:font script="Ethi" typeface="Nyala"/>
+        <a:font script="Beng" typeface="Vrinda"/>
+        <a:font script="Gujr" typeface="Shruti"/>
+        <a:font script="Khmr" typeface="DaunPenh"/>
+        <a:font script="Knda" typeface="Tunga"/>
+        <a:font script="Guru" typeface="Raavi"/>
+        <a:font script="Cans" typeface="Euphemia"/>
+        <a:font script="Cher" typeface="Plantagenet Cherokee"/>
+        <a:font script="Yiii" typeface="Microsoft Yi Baiti"/>
+        <a:font script="Tibt" typeface="Microsoft Himalaya"/>
+        <a:font script="Thaa" typeface="MV Boli"/>
+        <a:font script="Deva" typeface="Mangal"/>
+        <a:font script="Telu" typeface="Gautami"/>
+        <a:font script="Taml" typeface="Latha"/>
+        <a:font script="Syrc" typeface="Estrangelo Edessa"/>
+        <a:font script="Orya" typeface="Kalinga"/>
+        <a:font script="Mlym" typeface="Kartika"/>
+        <a:font script="Laoo" typeface="DokChampa"/>
+        <a:font script="Sinh" typeface="Iskoola Pota"/>
+        <a:font script="Mong" typeface="Mongolian Baiti"/>
+        <a:font script="Viet" typeface="Arial"/>
+        <a:font script="Uigh" typeface="Microsoft Uighur"/>
+        <a:font script="Geor" typeface="Sylfaen"/>
+        <a:font script="Armn" typeface="Arial"/>
+        <a:font script="Bugi" typeface="Leelawadee UI"/>
+        <a:font script="Bopo" typeface="Microsoft JhengHei"/>
+        <a:font script="Java" typeface="Javanese Text"/>
+        <a:font script="Lisu" typeface="Segoe UI"/>
+        <a:font script="Mymr" typeface="Myanmar Text"/>
+        <a:font script="Nkoo" typeface="Ebrima"/>
+        <a:font script="Olck" typeface="Nirmala UI"/>
+        <a:font script="Osma" typeface="Ebrima"/>
+        <a:font script="Phag" typeface="Phagspa"/>
+        <a:font script="Syrn" typeface="Estrangelo Edessa"/>
+        <a:font script="Syrj" typeface="Estrangelo Edessa"/>
+        <a:font script="Syre" typeface="Estrangelo Edessa"/>
+        <a:font script="Sora" typeface="Nirmala UI"/>
+        <a:font script="Tale" typeface="Microsoft Tai Le"/>
+        <a:font script="Talu" typeface="Microsoft New Tai Lue"/>
+        <a:font script="Tfng" typeface="Ebrima"/>
+      </a:minorFont>
+    </a:fontScheme>
+    <a:fmtScheme name="Office">
+      <a:fillStyleLst>
+        <a:solidFill>
+          <a:schemeClr val="phClr"/>
+        </a:solidFill>
+        <a:gradFill rotWithShape="1">
+          <a:gsLst>
+            <a:gs pos="0">
+              <a:schemeClr val="phClr">
+                <a:lumMod val="110000"/>
+                <a:satMod val="105000"/>
+                <a:tint val="67000"/>
+              </a:schemeClr>
+            </a:gs>
+            <a:gs pos="50000">
+              <a:schemeClr val="phClr">
+                <a:lumMod val="105000"/>
+                <a:satMod val="103000"/>
+                <a:tint val="73000"/>
+              </a:schemeClr>
+            </a:gs>
+            <a:gs pos="100000">
+              <a:schemeClr val="phClr">
+                <a:lumMod val="105000"/>
+                <a:satMod val="109000"/>
+                <a:tint val="81000"/>
+              </a:schemeClr>
+            </a:gs>
+          </a:gsLst>
+          <a:lin ang="5400000" scaled="0"/>
+        </a:gradFill>
+        <a:gradFill rotWithShape="1">
+          <a:gsLst>
+            <a:gs pos="0">
+              <a:schemeClr val="phClr">
+                <a:satMod val="103000"/>
+                <a:lumMod val="102000"/>
+                <a:tint val="94000"/>
+              </a:schemeClr>
+            </a:gs>
+            <a:gs pos="50000">
+              <a:schemeClr val="phClr">
+                <a:satMod val="110000"/>
+                <a:lumMod val="100000"/>
+                <a:shade val="100000"/>
+              </a:schemeClr>
+            </a:gs>
+            <a:gs pos="100000">
+              <a:schemeClr val="phClr">
+                <a:lumMod val="99000"/>
+                <a:satMod val="120000"/>
+                <a:shade val="78000"/>
+              </a:schemeClr>
+            </a:gs>
+          </a:gsLst>
+          <a:lin ang="5400000" scaled="0"/>
+        </a:gradFill>
+      </a:fillStyleLst>
+      <a:lnStyleLst>
+        <a:ln w="6350" cap="flat" cmpd="sng" algn="ctr">
+          <a:solidFill>
+            <a:schemeClr val="phClr"/>
+          </a:solidFill>
+          <a:prstDash val="solid"/>
+          <a:miter lim="800000"/>
+        </a:ln>
+        <a:ln w="12700" cap="flat" cmpd="sng" algn="ctr">
+          <a:solidFill>
+            <a:schemeClr val="phClr"/>
+          </a:solidFill>
+          <a:prstDash val="solid"/>
+          <a:miter lim="800000"/>
+        </a:ln>
+        <a:ln w="19050" cap="flat" cmpd="sng" algn="ctr">
+          <a:solidFill>
+            <a:schemeClr val="phClr"/>
+          </a:solidFill>
+          <a:prstDash val="solid"/>
+          <a:miter lim="800000"/>
+        </a:ln>
+      </a:lnStyleLst>
+      <a:effectStyleLst>
+        <a:effectStyle>
+          <a:effectLst/>
+        </a:effectStyle>
+        <a:effectStyle>
+          <a:effectLst/>
+        </a:effectStyle>
+        <a:effectStyle>
+          <a:effectLst>
+            <a:outerShdw blurRad="57150" dist="19050" dir="5400000" algn="ctr" rotWithShape="0">
+              <a:srgbClr val="000000">
+                <a:alpha val="63000"/>
+              </a:srgbClr>
+            </a:outerShdw>
+          </a:effectLst>
+        </a:effectStyle>
+      </a:effectStyleLst>
+      <a:bgFillStyleLst>
+        <a:solidFill>
+          <a:schemeClr val="phClr"/>
+        </a:solidFill>
+        <a:solidFill>
+          <a:schemeClr val="phClr">
+            <a:tint val="95000"/>
+            <a:satMod val="170000"/>
+          </a:schemeClr>
+        </a:solidFill>
+        <a:gradFill rotWithShape="1">
+          <a:gsLst>
+            <a:gs pos="0">
+              <a:schemeClr val="phClr">
+                <a:tint val="93000"/>
+                <a:satMod val="150000"/>
+                <a:shade val="98000"/>
+                <a:lumMod val="102000"/>
+              </a:schemeClr>
+            </a:gs>
+            <a:gs pos="50000">
+              <a:schemeClr val="phClr">
+                <a:tint val="98000"/>
+                <a:satMod val="130000"/>
+                <a:shade val="90000"/>
+                <a:lumMod val="103000"/>
+              </a:schemeClr>
+            </a:gs>
+            <a:gs pos="100000">
+              <a:schemeClr val="phClr">
+                <a:shade val="63000"/>
+                <a:satMod val="120000"/>
+              </a:schemeClr>
+            </a:gs>
+          </a:gsLst>
+          <a:lin ang="5400000" scaled="0"/>
+        </a:gradFill>
+      </a:bgFillStyleLst>
+    </a:fmtScheme>
+  </a:themeElements>
+  <a:objectDefaults/>
+  <a:extraClrSchemeLst/>
+  <a:extLst>
+    <a:ext uri="{05A4C25C-085E-4340-85A3-A5531E510DB2}">
+      <thm15:themeFamily xmlns:thm15="http://schemas.microsoft.com/office/thememl/2012/main" name="Office Theme" id="{62F939B6-93AF-4DB8-9C6B-D6C7DFDC589F}" vid="{4A3C46E8-61CC-4603-A589-7422A47A8E4A}"/>
+    </a:ext>
+  </a:extLst>
+</a:theme>
 </file>
</xml_diff>